<commit_message>
Atualizei a pasta de imagens e o nome do meu protótipo financeiro
</commit_message>
<xml_diff>
--- a/Algoritmos/Prototipos/Protótipo do site.pptx
+++ b/Algoritmos/Prototipos/Protótipo do site.pptx
@@ -259,7 +259,7 @@
           <a:p>
             <a:fld id="{6FFC8208-4D46-4598-91F0-6171C3CE863F}" type="datetimeFigureOut">
               <a:rPr lang="pt-BR" smtClean="0"/>
-              <a:t>11/09/2020</a:t>
+              <a:t>18/09/2020</a:t>
             </a:fld>
             <a:endParaRPr lang="pt-BR"/>
           </a:p>
@@ -457,7 +457,7 @@
           <a:p>
             <a:fld id="{6FFC8208-4D46-4598-91F0-6171C3CE863F}" type="datetimeFigureOut">
               <a:rPr lang="pt-BR" smtClean="0"/>
-              <a:t>11/09/2020</a:t>
+              <a:t>18/09/2020</a:t>
             </a:fld>
             <a:endParaRPr lang="pt-BR"/>
           </a:p>
@@ -665,7 +665,7 @@
           <a:p>
             <a:fld id="{6FFC8208-4D46-4598-91F0-6171C3CE863F}" type="datetimeFigureOut">
               <a:rPr lang="pt-BR" smtClean="0"/>
-              <a:t>11/09/2020</a:t>
+              <a:t>18/09/2020</a:t>
             </a:fld>
             <a:endParaRPr lang="pt-BR"/>
           </a:p>
@@ -863,7 +863,7 @@
           <a:p>
             <a:fld id="{6FFC8208-4D46-4598-91F0-6171C3CE863F}" type="datetimeFigureOut">
               <a:rPr lang="pt-BR" smtClean="0"/>
-              <a:t>11/09/2020</a:t>
+              <a:t>18/09/2020</a:t>
             </a:fld>
             <a:endParaRPr lang="pt-BR"/>
           </a:p>
@@ -1138,7 +1138,7 @@
           <a:p>
             <a:fld id="{6FFC8208-4D46-4598-91F0-6171C3CE863F}" type="datetimeFigureOut">
               <a:rPr lang="pt-BR" smtClean="0"/>
-              <a:t>11/09/2020</a:t>
+              <a:t>18/09/2020</a:t>
             </a:fld>
             <a:endParaRPr lang="pt-BR"/>
           </a:p>
@@ -1403,7 +1403,7 @@
           <a:p>
             <a:fld id="{6FFC8208-4D46-4598-91F0-6171C3CE863F}" type="datetimeFigureOut">
               <a:rPr lang="pt-BR" smtClean="0"/>
-              <a:t>11/09/2020</a:t>
+              <a:t>18/09/2020</a:t>
             </a:fld>
             <a:endParaRPr lang="pt-BR"/>
           </a:p>
@@ -1815,7 +1815,7 @@
           <a:p>
             <a:fld id="{6FFC8208-4D46-4598-91F0-6171C3CE863F}" type="datetimeFigureOut">
               <a:rPr lang="pt-BR" smtClean="0"/>
-              <a:t>11/09/2020</a:t>
+              <a:t>18/09/2020</a:t>
             </a:fld>
             <a:endParaRPr lang="pt-BR"/>
           </a:p>
@@ -1956,7 +1956,7 @@
           <a:p>
             <a:fld id="{6FFC8208-4D46-4598-91F0-6171C3CE863F}" type="datetimeFigureOut">
               <a:rPr lang="pt-BR" smtClean="0"/>
-              <a:t>11/09/2020</a:t>
+              <a:t>18/09/2020</a:t>
             </a:fld>
             <a:endParaRPr lang="pt-BR"/>
           </a:p>
@@ -2069,7 +2069,7 @@
           <a:p>
             <a:fld id="{6FFC8208-4D46-4598-91F0-6171C3CE863F}" type="datetimeFigureOut">
               <a:rPr lang="pt-BR" smtClean="0"/>
-              <a:t>11/09/2020</a:t>
+              <a:t>18/09/2020</a:t>
             </a:fld>
             <a:endParaRPr lang="pt-BR"/>
           </a:p>
@@ -2380,7 +2380,7 @@
           <a:p>
             <a:fld id="{6FFC8208-4D46-4598-91F0-6171C3CE863F}" type="datetimeFigureOut">
               <a:rPr lang="pt-BR" smtClean="0"/>
-              <a:t>11/09/2020</a:t>
+              <a:t>18/09/2020</a:t>
             </a:fld>
             <a:endParaRPr lang="pt-BR"/>
           </a:p>
@@ -2668,7 +2668,7 @@
           <a:p>
             <a:fld id="{6FFC8208-4D46-4598-91F0-6171C3CE863F}" type="datetimeFigureOut">
               <a:rPr lang="pt-BR" smtClean="0"/>
-              <a:t>11/09/2020</a:t>
+              <a:t>18/09/2020</a:t>
             </a:fld>
             <a:endParaRPr lang="pt-BR"/>
           </a:p>
@@ -2909,7 +2909,7 @@
           <a:p>
             <a:fld id="{6FFC8208-4D46-4598-91F0-6171C3CE863F}" type="datetimeFigureOut">
               <a:rPr lang="pt-BR" smtClean="0"/>
-              <a:t>11/09/2020</a:t>
+              <a:t>18/09/2020</a:t>
             </a:fld>
             <a:endParaRPr lang="pt-BR"/>
           </a:p>
@@ -3742,7 +3742,7 @@
         <p:spPr>
           <a:xfrm>
             <a:off x="5974085" y="2293112"/>
-            <a:ext cx="3230872" cy="309187"/>
+            <a:ext cx="3230871" cy="309187"/>
           </a:xfrm>
           <a:prstGeom prst="rect">
             <a:avLst/>
@@ -3808,8 +3808,8 @@
         </p:nvSpPr>
         <p:spPr>
           <a:xfrm>
-            <a:off x="9204960" y="2295984"/>
-            <a:ext cx="2987039" cy="309187"/>
+            <a:off x="9204960" y="2293112"/>
+            <a:ext cx="2987039" cy="312059"/>
           </a:xfrm>
           <a:prstGeom prst="rect">
             <a:avLst/>
@@ -3823,7 +3823,7 @@
         </p:spPr>
         <p:txBody>
           <a:bodyPr vert="horz" lIns="91440" tIns="45720" rIns="91440" bIns="45720" rtlCol="0" anchor="t">
-            <a:normAutofit lnSpcReduction="10000"/>
+            <a:normAutofit/>
           </a:bodyPr>
           <a:lstStyle>
             <a:lvl1pPr algn="l" defTabSz="914400" rtl="0" eaLnBrk="1" latinLnBrk="0" hangingPunct="1">

</xml_diff>